<commit_message>
I FORGOT FIGURE 1C IN THE CAPTION
...but I didn't actually submit it yet :)
</commit_message>
<xml_diff>
--- a/Fellowship Conference 2022/Poster_Submitted 07.31.pptx
+++ b/Fellowship Conference 2022/Poster_Submitted 07.31.pptx
@@ -3915,7 +3915,7 @@
               <a:rPr lang="en-US" sz="2800" i="1" dirty="0">
                 <a:latin typeface="Amasis MT Pro" panose="02040504050005020304" pitchFamily="18" charset="0"/>
               </a:rPr>
-              <a:t>Figures 1A &amp; 1B: Graphical representations of listeners responses to the </a:t>
+              <a:t>Figures 1A, 1B, &amp; 1C: Graphical representations of listeners responses to the </a:t>
             </a:r>
             <a:r>
               <a:rPr lang="en-US" sz="2800" i="1" dirty="0" err="1">
@@ -3945,8 +3945,17 @@
               <a:rPr lang="en-US" sz="2800" i="1" dirty="0">
                 <a:latin typeface="Amasis MT Pro" panose="02040504050005020304" pitchFamily="18" charset="0"/>
               </a:rPr>
-              <a:t>/), rather than “asi” (/s/). If perceptual adaptation is dependent on attentional resources, we anticipate listener’ adjustment to the unattended talker will be constrained.</a:t>
-            </a:r>
+              <a:t>/), rather than “asi” (/s/). If perceptual adaptation is dependent on attentional resources, we anticipate listener’ adjustment to the unattended talker will </a:t>
+            </a:r>
+            <a:r>
+              <a:rPr lang="en-US" sz="2800" i="1">
+                <a:latin typeface="Amasis MT Pro" panose="02040504050005020304" pitchFamily="18" charset="0"/>
+              </a:rPr>
+              <a:t>be constrained (Figure 1A).</a:t>
+            </a:r>
+            <a:endParaRPr lang="en-US" sz="2800" i="1" dirty="0">
+              <a:latin typeface="Amasis MT Pro" panose="02040504050005020304" pitchFamily="18" charset="0"/>
+            </a:endParaRPr>
           </a:p>
         </p:txBody>
       </p:sp>

</xml_diff>